<commit_message>
MedDRA triple creation switched from redland pkg to rdflib package.
</commit_message>
<xml_diff>
--- a/doc/images/ImageSources.pptx
+++ b/doc/images/ImageSources.pptx
@@ -11642,119 +11642,6 @@
       </p:sp>
       <p:sp>
         <p:nvSpPr>
-          <p:cNvPr id="37" name="Rectangle: Rounded Corners 36">
-            <a:extLst>
-              <a:ext uri="{FF2B5EF4-FFF2-40B4-BE49-F238E27FC236}">
-                <a16:creationId xmlns:a16="http://schemas.microsoft.com/office/drawing/2014/main" id="{36F0524D-C4D2-406B-B29F-D8B995EF1F1B}"/>
-              </a:ext>
-            </a:extLst>
-          </p:cNvPr>
-          <p:cNvSpPr/>
-          <p:nvPr/>
-        </p:nvSpPr>
-        <p:spPr>
-          <a:xfrm>
-            <a:off x="8472761" y="3193917"/>
-            <a:ext cx="1737360" cy="365760"/>
-          </a:xfrm>
-          <a:prstGeom prst="roundRect">
-            <a:avLst/>
-          </a:prstGeom>
-          <a:solidFill>
-            <a:schemeClr val="accent6">
-              <a:lumMod val="20000"/>
-              <a:lumOff val="80000"/>
-            </a:schemeClr>
-          </a:solidFill>
-        </p:spPr>
-        <p:style>
-          <a:lnRef idx="2">
-            <a:schemeClr val="accent1">
-              <a:shade val="50000"/>
-            </a:schemeClr>
-          </a:lnRef>
-          <a:fillRef idx="1">
-            <a:schemeClr val="accent1"/>
-          </a:fillRef>
-          <a:effectRef idx="0">
-            <a:schemeClr val="accent1"/>
-          </a:effectRef>
-          <a:fontRef idx="minor">
-            <a:schemeClr val="lt1"/>
-          </a:fontRef>
-        </p:style>
-        <p:txBody>
-          <a:bodyPr rtlCol="0" anchor="ctr"/>
-          <a:lstStyle/>
-          <a:p>
-            <a:pPr algn="ctr"/>
-            <a:r>
-              <a:rPr lang="en-US" sz="1200" dirty="0" err="1">
-                <a:solidFill>
-                  <a:schemeClr val="tx1"/>
-                </a:solidFill>
-              </a:rPr>
-              <a:t>ChecksOntToJSON</a:t>
-            </a:r>
-            <a:r>
-              <a:rPr lang="en-US" sz="1200" dirty="0">
-                <a:solidFill>
-                  <a:schemeClr val="tx1"/>
-                </a:solidFill>
-              </a:rPr>
-              <a:t>-TTL.R</a:t>
-            </a:r>
-          </a:p>
-        </p:txBody>
-      </p:sp>
-      <p:cxnSp>
-        <p:nvCxnSpPr>
-          <p:cNvPr id="38" name="Connector: Elbow 37">
-            <a:extLst>
-              <a:ext uri="{FF2B5EF4-FFF2-40B4-BE49-F238E27FC236}">
-                <a16:creationId xmlns:a16="http://schemas.microsoft.com/office/drawing/2014/main" id="{241E245B-054A-4AA8-BF09-BD33B1D5F9CC}"/>
-              </a:ext>
-            </a:extLst>
-          </p:cNvPr>
-          <p:cNvCxnSpPr>
-            <a:cxnSpLocks/>
-            <a:stCxn id="31" idx="2"/>
-            <a:endCxn id="37" idx="1"/>
-          </p:cNvCxnSpPr>
-          <p:nvPr/>
-        </p:nvCxnSpPr>
-        <p:spPr>
-          <a:xfrm rot="5400000" flipH="1" flipV="1">
-            <a:off x="7983391" y="3331145"/>
-            <a:ext cx="443718" cy="535021"/>
-          </a:xfrm>
-          <a:prstGeom prst="bentConnector4">
-            <a:avLst>
-              <a:gd name="adj1" fmla="val -51519"/>
-              <a:gd name="adj2" fmla="val -183164"/>
-            </a:avLst>
-          </a:prstGeom>
-          <a:ln w="25400">
-            <a:tailEnd type="triangle"/>
-          </a:ln>
-        </p:spPr>
-        <p:style>
-          <a:lnRef idx="1">
-            <a:schemeClr val="accent1"/>
-          </a:lnRef>
-          <a:fillRef idx="0">
-            <a:schemeClr val="accent1"/>
-          </a:fillRef>
-          <a:effectRef idx="0">
-            <a:schemeClr val="accent1"/>
-          </a:effectRef>
-          <a:fontRef idx="minor">
-            <a:schemeClr val="tx1"/>
-          </a:fontRef>
-        </p:style>
-      </p:cxnSp>
-      <p:sp>
-        <p:nvSpPr>
           <p:cNvPr id="39" name="TextBox 38">
             <a:extLst>
               <a:ext uri="{FF2B5EF4-FFF2-40B4-BE49-F238E27FC236}">
@@ -11768,7 +11655,7 @@
         <p:spPr>
           <a:xfrm>
             <a:off x="6958374" y="6003767"/>
-            <a:ext cx="1614545" cy="246221"/>
+            <a:ext cx="1598515" cy="246221"/>
           </a:xfrm>
           <a:prstGeom prst="rect">
             <a:avLst/>
@@ -11783,7 +11670,7 @@
           <a:p>
             <a:r>
               <a:rPr lang="en-US" sz="1000" dirty="0"/>
-              <a:t>Source: ProgramFlows.pptx</a:t>
+              <a:t>Source: ImageSources.pptx</a:t>
             </a:r>
           </a:p>
         </p:txBody>
@@ -11799,7 +11686,6 @@
           </p:cNvPr>
           <p:cNvCxnSpPr>
             <a:cxnSpLocks/>
-            <a:stCxn id="37" idx="3"/>
             <a:endCxn id="35" idx="2"/>
           </p:cNvCxnSpPr>
           <p:nvPr/>
@@ -11988,8 +11874,8 @@
         </p:nvSpPr>
         <p:spPr>
           <a:xfrm>
-            <a:off x="9919905" y="2509521"/>
-            <a:ext cx="1237140" cy="365760"/>
+            <a:off x="5866626" y="4525330"/>
+            <a:ext cx="1645920" cy="365760"/>
           </a:xfrm>
           <a:prstGeom prst="roundRect">
             <a:avLst/>
@@ -12037,7 +11923,7 @@
                   </a:schemeClr>
                 </a:solidFill>
               </a:rPr>
-              <a:t>SMSMapVis</a:t>
+              <a:t>compTriplesTTL</a:t>
             </a:r>
             <a:r>
               <a:rPr lang="en-US" sz="1200" dirty="0">
@@ -12049,91 +11935,6 @@
               </a:rPr>
               <a:t>-app</a:t>
             </a:r>
-          </a:p>
-        </p:txBody>
-      </p:sp>
-      <p:sp>
-        <p:nvSpPr>
-          <p:cNvPr id="51" name="Rectangle: Rounded Corners 50">
-            <a:extLst>
-              <a:ext uri="{FF2B5EF4-FFF2-40B4-BE49-F238E27FC236}">
-                <a16:creationId xmlns:a16="http://schemas.microsoft.com/office/drawing/2014/main" id="{7F75D476-E583-4F30-A03A-14454691CC79}"/>
-              </a:ext>
-            </a:extLst>
-          </p:cNvPr>
-          <p:cNvSpPr/>
-          <p:nvPr/>
-        </p:nvSpPr>
-        <p:spPr>
-          <a:xfrm>
-            <a:off x="5534841" y="6184077"/>
-            <a:ext cx="1613847" cy="381743"/>
-          </a:xfrm>
-          <a:prstGeom prst="roundRect">
-            <a:avLst/>
-          </a:prstGeom>
-          <a:solidFill>
-            <a:schemeClr val="accent1">
-              <a:lumMod val="50000"/>
-            </a:schemeClr>
-          </a:solidFill>
-          <a:ln w="25400">
-            <a:solidFill>
-              <a:schemeClr val="bg1">
-                <a:lumMod val="75000"/>
-              </a:schemeClr>
-            </a:solidFill>
-            <a:prstDash val="solid"/>
-          </a:ln>
-        </p:spPr>
-        <p:style>
-          <a:lnRef idx="2">
-            <a:schemeClr val="accent1">
-              <a:shade val="50000"/>
-            </a:schemeClr>
-          </a:lnRef>
-          <a:fillRef idx="1">
-            <a:schemeClr val="accent1"/>
-          </a:fillRef>
-          <a:effectRef idx="0">
-            <a:schemeClr val="accent1"/>
-          </a:effectRef>
-          <a:fontRef idx="minor">
-            <a:schemeClr val="lt1"/>
-          </a:fontRef>
-        </p:style>
-        <p:txBody>
-          <a:bodyPr rtlCol="0" anchor="ctr"/>
-          <a:lstStyle/>
-          <a:p>
-            <a:pPr algn="ctr"/>
-            <a:r>
-              <a:rPr lang="en-US" sz="1200" dirty="0">
-                <a:solidFill>
-                  <a:schemeClr val="bg1">
-                    <a:lumMod val="85000"/>
-                  </a:schemeClr>
-                </a:solidFill>
-              </a:rPr>
-              <a:t>foo-</a:t>
-            </a:r>
-            <a:r>
-              <a:rPr lang="en-US" sz="1200" dirty="0" err="1">
-                <a:solidFill>
-                  <a:schemeClr val="bg1">
-                    <a:lumMod val="85000"/>
-                  </a:schemeClr>
-                </a:solidFill>
-              </a:rPr>
-              <a:t>app.R</a:t>
-            </a:r>
-            <a:endParaRPr lang="en-US" sz="1200" dirty="0">
-              <a:solidFill>
-                <a:schemeClr val="bg1">
-                  <a:lumMod val="85000"/>
-                </a:schemeClr>
-              </a:solidFill>
-            </a:endParaRPr>
           </a:p>
         </p:txBody>
       </p:sp>
@@ -12147,14 +11948,16 @@
             </a:extLst>
           </p:cNvPr>
           <p:cNvCxnSpPr>
+            <a:cxnSpLocks/>
+            <a:stCxn id="67" idx="3"/>
             <a:endCxn id="50" idx="1"/>
           </p:cNvCxnSpPr>
           <p:nvPr/>
         </p:nvCxnSpPr>
         <p:spPr>
-          <a:xfrm>
-            <a:off x="9454536" y="2692401"/>
-            <a:ext cx="465369" cy="0"/>
+          <a:xfrm flipV="1">
+            <a:off x="3299982" y="4708210"/>
+            <a:ext cx="2566644" cy="664186"/>
           </a:xfrm>
           <a:prstGeom prst="straightConnector1">
             <a:avLst/>
@@ -14023,6 +13826,260 @@
           </a:fontRef>
         </p:style>
       </p:cxnSp>
+      <p:sp>
+        <p:nvSpPr>
+          <p:cNvPr id="351" name="Rectangle: Rounded Corners 350">
+            <a:extLst>
+              <a:ext uri="{FF2B5EF4-FFF2-40B4-BE49-F238E27FC236}">
+                <a16:creationId xmlns:a16="http://schemas.microsoft.com/office/drawing/2014/main" id="{77B4770B-BA6C-4B0B-82A3-EC5E1093BC3D}"/>
+              </a:ext>
+            </a:extLst>
+          </p:cNvPr>
+          <p:cNvSpPr/>
+          <p:nvPr/>
+        </p:nvSpPr>
+        <p:spPr>
+          <a:xfrm>
+            <a:off x="8562983" y="4548873"/>
+            <a:ext cx="1371600" cy="365760"/>
+          </a:xfrm>
+          <a:prstGeom prst="roundRect">
+            <a:avLst/>
+          </a:prstGeom>
+          <a:solidFill>
+            <a:schemeClr val="accent4">
+              <a:lumMod val="40000"/>
+              <a:lumOff val="60000"/>
+            </a:schemeClr>
+          </a:solidFill>
+        </p:spPr>
+        <p:style>
+          <a:lnRef idx="2">
+            <a:schemeClr val="accent1">
+              <a:shade val="50000"/>
+            </a:schemeClr>
+          </a:lnRef>
+          <a:fillRef idx="1">
+            <a:schemeClr val="accent1"/>
+          </a:fillRef>
+          <a:effectRef idx="0">
+            <a:schemeClr val="accent1"/>
+          </a:effectRef>
+          <a:fontRef idx="minor">
+            <a:schemeClr val="lt1"/>
+          </a:fontRef>
+        </p:style>
+        <p:txBody>
+          <a:bodyPr lIns="45720" rIns="45720" rtlCol="0" anchor="ctr"/>
+          <a:lstStyle/>
+          <a:p>
+            <a:pPr algn="ctr"/>
+            <a:r>
+              <a:rPr lang="en-US" sz="1200" dirty="0" err="1">
+                <a:solidFill>
+                  <a:schemeClr val="tx1"/>
+                </a:solidFill>
+              </a:rPr>
+              <a:t>meddra.ttl</a:t>
+            </a:r>
+            <a:endParaRPr lang="en-US" sz="1200" dirty="0">
+              <a:solidFill>
+                <a:schemeClr val="tx1"/>
+              </a:solidFill>
+            </a:endParaRPr>
+          </a:p>
+        </p:txBody>
+      </p:sp>
+      <p:cxnSp>
+        <p:nvCxnSpPr>
+          <p:cNvPr id="352" name="Straight Arrow Connector 351">
+            <a:extLst>
+              <a:ext uri="{FF2B5EF4-FFF2-40B4-BE49-F238E27FC236}">
+                <a16:creationId xmlns:a16="http://schemas.microsoft.com/office/drawing/2014/main" id="{12F2AF7C-AF4D-49A1-A5EF-B8154F3F12BC}"/>
+              </a:ext>
+            </a:extLst>
+          </p:cNvPr>
+          <p:cNvCxnSpPr>
+            <a:cxnSpLocks/>
+            <a:stCxn id="351" idx="1"/>
+            <a:endCxn id="50" idx="3"/>
+          </p:cNvCxnSpPr>
+          <p:nvPr/>
+        </p:nvCxnSpPr>
+        <p:spPr>
+          <a:xfrm flipH="1" flipV="1">
+            <a:off x="7512546" y="4708210"/>
+            <a:ext cx="1050437" cy="23543"/>
+          </a:xfrm>
+          <a:prstGeom prst="straightConnector1">
+            <a:avLst/>
+          </a:prstGeom>
+          <a:ln w="25400">
+            <a:tailEnd type="triangle"/>
+          </a:ln>
+        </p:spPr>
+        <p:style>
+          <a:lnRef idx="1">
+            <a:schemeClr val="accent1"/>
+          </a:lnRef>
+          <a:fillRef idx="0">
+            <a:schemeClr val="accent1"/>
+          </a:fillRef>
+          <a:effectRef idx="0">
+            <a:schemeClr val="accent1"/>
+          </a:effectRef>
+          <a:fontRef idx="minor">
+            <a:schemeClr val="tx1"/>
+          </a:fontRef>
+        </p:style>
+      </p:cxnSp>
+      <p:sp>
+        <p:nvSpPr>
+          <p:cNvPr id="359" name="Rectangle: Rounded Corners 358">
+            <a:extLst>
+              <a:ext uri="{FF2B5EF4-FFF2-40B4-BE49-F238E27FC236}">
+                <a16:creationId xmlns:a16="http://schemas.microsoft.com/office/drawing/2014/main" id="{8E762F08-0821-4AAD-8CC3-CCDD0471D016}"/>
+              </a:ext>
+            </a:extLst>
+          </p:cNvPr>
+          <p:cNvSpPr/>
+          <p:nvPr/>
+        </p:nvSpPr>
+        <p:spPr>
+          <a:xfrm>
+            <a:off x="203029" y="5555276"/>
+            <a:ext cx="1371600" cy="365760"/>
+          </a:xfrm>
+          <a:prstGeom prst="roundRect">
+            <a:avLst/>
+          </a:prstGeom>
+          <a:solidFill>
+            <a:schemeClr val="accent4">
+              <a:lumMod val="40000"/>
+              <a:lumOff val="60000"/>
+            </a:schemeClr>
+          </a:solidFill>
+        </p:spPr>
+        <p:style>
+          <a:lnRef idx="2">
+            <a:schemeClr val="accent1">
+              <a:shade val="50000"/>
+            </a:schemeClr>
+          </a:lnRef>
+          <a:fillRef idx="1">
+            <a:schemeClr val="accent1"/>
+          </a:fillRef>
+          <a:effectRef idx="0">
+            <a:schemeClr val="accent1"/>
+          </a:effectRef>
+          <a:fontRef idx="minor">
+            <a:schemeClr val="lt1"/>
+          </a:fontRef>
+        </p:style>
+        <p:txBody>
+          <a:bodyPr lIns="45720" rIns="45720" rtlCol="0" anchor="ctr"/>
+          <a:lstStyle/>
+          <a:p>
+            <a:pPr algn="ctr"/>
+            <a:r>
+              <a:rPr lang="en-US" sz="1200" dirty="0" err="1">
+                <a:solidFill>
+                  <a:schemeClr val="tx1"/>
+                </a:solidFill>
+              </a:rPr>
+              <a:t>meddra.ttl</a:t>
+            </a:r>
+            <a:endParaRPr lang="en-US" sz="1200" dirty="0">
+              <a:solidFill>
+                <a:schemeClr val="tx1"/>
+              </a:solidFill>
+            </a:endParaRPr>
+          </a:p>
+        </p:txBody>
+      </p:sp>
+      <p:cxnSp>
+        <p:nvCxnSpPr>
+          <p:cNvPr id="360" name="Straight Arrow Connector 359">
+            <a:extLst>
+              <a:ext uri="{FF2B5EF4-FFF2-40B4-BE49-F238E27FC236}">
+                <a16:creationId xmlns:a16="http://schemas.microsoft.com/office/drawing/2014/main" id="{048FDBF3-E595-4EAA-8AFC-0FDCDF55183E}"/>
+              </a:ext>
+            </a:extLst>
+          </p:cNvPr>
+          <p:cNvCxnSpPr>
+            <a:cxnSpLocks/>
+            <a:stCxn id="359" idx="3"/>
+          </p:cNvCxnSpPr>
+          <p:nvPr/>
+        </p:nvCxnSpPr>
+        <p:spPr>
+          <a:xfrm>
+            <a:off x="1574629" y="5738156"/>
+            <a:ext cx="1037944" cy="18821"/>
+          </a:xfrm>
+          <a:prstGeom prst="straightConnector1">
+            <a:avLst/>
+          </a:prstGeom>
+          <a:ln w="25400">
+            <a:tailEnd type="triangle"/>
+          </a:ln>
+        </p:spPr>
+        <p:style>
+          <a:lnRef idx="1">
+            <a:schemeClr val="accent1"/>
+          </a:lnRef>
+          <a:fillRef idx="0">
+            <a:schemeClr val="accent1"/>
+          </a:fillRef>
+          <a:effectRef idx="0">
+            <a:schemeClr val="accent1"/>
+          </a:effectRef>
+          <a:fontRef idx="minor">
+            <a:schemeClr val="tx1"/>
+          </a:fontRef>
+        </p:style>
+      </p:cxnSp>
+      <p:sp>
+        <p:nvSpPr>
+          <p:cNvPr id="365" name="TextBox 364">
+            <a:extLst>
+              <a:ext uri="{FF2B5EF4-FFF2-40B4-BE49-F238E27FC236}">
+                <a16:creationId xmlns:a16="http://schemas.microsoft.com/office/drawing/2014/main" id="{E8031B79-CD95-4777-ABB6-52D1F2260D1B}"/>
+              </a:ext>
+            </a:extLst>
+          </p:cNvPr>
+          <p:cNvSpPr txBox="1"/>
+          <p:nvPr/>
+        </p:nvSpPr>
+        <p:spPr>
+          <a:xfrm>
+            <a:off x="284588" y="6003766"/>
+            <a:ext cx="1189749" cy="400110"/>
+          </a:xfrm>
+          <a:prstGeom prst="rect">
+            <a:avLst/>
+          </a:prstGeom>
+          <a:noFill/>
+        </p:spPr>
+        <p:txBody>
+          <a:bodyPr wrap="none" rtlCol="0">
+            <a:spAutoFit/>
+          </a:bodyPr>
+          <a:lstStyle/>
+          <a:p>
+            <a:r>
+              <a:rPr lang="en-US" sz="1000" dirty="0"/>
+              <a:t>Ontology triples </a:t>
+            </a:r>
+          </a:p>
+          <a:p>
+            <a:r>
+              <a:rPr lang="en-US" sz="1000" dirty="0"/>
+              <a:t>(non instance data)</a:t>
+            </a:r>
+          </a:p>
+        </p:txBody>
+      </p:sp>
     </p:spTree>
     <p:extLst>
       <p:ext uri="{BB962C8B-B14F-4D97-AF65-F5344CB8AC3E}">

</xml_diff>